<commit_message>
Taller 2 finished / A-Frame added
</commit_message>
<xml_diff>
--- a/Talleres/Taller1.pptx
+++ b/Talleres/Taller1.pptx
@@ -4397,7 +4397,7 @@
           <a:p>
             <a:fld id="{78ABE3C1-DBE1-495D-B57B-2849774B866A}" type="datetimeFigureOut">
               <a:rPr lang="en-US" smtClean="0"/>
-              <a:t>5/25/2019</a:t>
+              <a:t>5/26/2019</a:t>
             </a:fld>
             <a:endParaRPr lang="en-US" dirty="0"/>
           </a:p>
@@ -4664,7 +4664,7 @@
           <a:p>
             <a:fld id="{446C117F-5CCF-4837-BE5F-2B92066CAFAF}" type="datetimeFigureOut">
               <a:rPr lang="en-US" smtClean="0"/>
-              <a:t>5/25/2019</a:t>
+              <a:t>5/26/2019</a:t>
             </a:fld>
             <a:endParaRPr lang="en-US" dirty="0"/>
           </a:p>
@@ -4860,7 +4860,7 @@
           <a:p>
             <a:fld id="{84EB90BD-B6CE-46B7-997F-7313B992CCDC}" type="datetimeFigureOut">
               <a:rPr lang="en-US" smtClean="0"/>
-              <a:t>5/25/2019</a:t>
+              <a:t>5/26/2019</a:t>
             </a:fld>
             <a:endParaRPr lang="en-US" dirty="0"/>
           </a:p>
@@ -5123,7 +5123,7 @@
           <a:p>
             <a:fld id="{CDB9D11F-B188-461D-B23F-39381795C052}" type="datetimeFigureOut">
               <a:rPr lang="en-US" smtClean="0"/>
-              <a:t>5/25/2019</a:t>
+              <a:t>5/26/2019</a:t>
             </a:fld>
             <a:endParaRPr lang="en-US" dirty="0"/>
           </a:p>
@@ -5557,7 +5557,7 @@
           <a:p>
             <a:fld id="{52E6D8D9-55A2-4063-B0F3-121F44549695}" type="datetimeFigureOut">
               <a:rPr lang="en-US" smtClean="0"/>
-              <a:t>5/25/2019</a:t>
+              <a:t>5/26/2019</a:t>
             </a:fld>
             <a:endParaRPr lang="en-US" dirty="0"/>
           </a:p>
@@ -6103,7 +6103,7 @@
           <a:p>
             <a:fld id="{D4B24536-994D-4021-A283-9F449C0DB509}" type="datetimeFigureOut">
               <a:rPr lang="en-US" smtClean="0"/>
-              <a:t>5/25/2019</a:t>
+              <a:t>5/26/2019</a:t>
             </a:fld>
             <a:endParaRPr lang="en-US" dirty="0"/>
           </a:p>
@@ -6823,7 +6823,7 @@
           <a:p>
             <a:fld id="{3CBBBB78-C96F-47B7-AB17-D852CA960AC9}" type="datetimeFigureOut">
               <a:rPr lang="en-US" smtClean="0"/>
-              <a:t>5/25/2019</a:t>
+              <a:t>5/26/2019</a:t>
             </a:fld>
             <a:endParaRPr lang="en-US" dirty="0"/>
           </a:p>
@@ -6993,7 +6993,7 @@
           <a:p>
             <a:fld id="{1FA3F48C-C7C6-4055-9F49-3777875E72AE}" type="datetimeFigureOut">
               <a:rPr lang="en-US" smtClean="0"/>
-              <a:t>5/25/2019</a:t>
+              <a:t>5/26/2019</a:t>
             </a:fld>
             <a:endParaRPr lang="en-US" dirty="0"/>
           </a:p>
@@ -7173,7 +7173,7 @@
           <a:p>
             <a:fld id="{6178E61D-D431-422C-9764-11DAFE33AB63}" type="datetimeFigureOut">
               <a:rPr lang="en-US" smtClean="0"/>
-              <a:t>5/25/2019</a:t>
+              <a:t>5/26/2019</a:t>
             </a:fld>
             <a:endParaRPr lang="en-US" dirty="0"/>
           </a:p>
@@ -7344,7 +7344,7 @@
           <a:p>
             <a:fld id="{12DE42F4-6EEF-4EF7-8ED4-2208F0F89A08}" type="datetimeFigureOut">
               <a:rPr lang="en-US" smtClean="0"/>
-              <a:t>5/25/2019</a:t>
+              <a:t>5/26/2019</a:t>
             </a:fld>
             <a:endParaRPr lang="en-US" dirty="0"/>
           </a:p>
@@ -7594,7 +7594,7 @@
           <a:p>
             <a:fld id="{30578ACC-22D6-47C1-A373-4FD133E34F3C}" type="datetimeFigureOut">
               <a:rPr lang="en-US" smtClean="0"/>
-              <a:t>5/25/2019</a:t>
+              <a:t>5/26/2019</a:t>
             </a:fld>
             <a:endParaRPr lang="en-US" dirty="0"/>
           </a:p>
@@ -7826,7 +7826,7 @@
           <a:p>
             <a:fld id="{4E5A6C69-6797-4E8A-BF37-F2C3751466E9}" type="datetimeFigureOut">
               <a:rPr lang="en-US" smtClean="0"/>
-              <a:t>5/25/2019</a:t>
+              <a:t>5/26/2019</a:t>
             </a:fld>
             <a:endParaRPr lang="en-US" dirty="0"/>
           </a:p>
@@ -8207,7 +8207,7 @@
           <a:p>
             <a:fld id="{D82014A1-A632-4878-A0D3-F52BA7563730}" type="datetimeFigureOut">
               <a:rPr lang="en-US" smtClean="0"/>
-              <a:t>5/25/2019</a:t>
+              <a:t>5/26/2019</a:t>
             </a:fld>
             <a:endParaRPr lang="en-US" dirty="0"/>
           </a:p>
@@ -8325,7 +8325,7 @@
           <a:p>
             <a:fld id="{CE99F462-093F-4566-844B-4C71F2739DA5}" type="datetimeFigureOut">
               <a:rPr lang="en-US" smtClean="0"/>
-              <a:t>5/25/2019</a:t>
+              <a:t>5/26/2019</a:t>
             </a:fld>
             <a:endParaRPr lang="en-US" dirty="0"/>
           </a:p>
@@ -8420,7 +8420,7 @@
           <a:p>
             <a:fld id="{3D24A7AC-904D-4781-85BA-7D10C17ED021}" type="datetimeFigureOut">
               <a:rPr lang="en-US" smtClean="0"/>
-              <a:t>5/25/2019</a:t>
+              <a:t>5/26/2019</a:t>
             </a:fld>
             <a:endParaRPr lang="en-US" dirty="0"/>
           </a:p>
@@ -8669,7 +8669,7 @@
           <a:p>
             <a:fld id="{E331444B-B92B-4E27-8C94-BB93EAF5CB18}" type="datetimeFigureOut">
               <a:rPr lang="en-US" smtClean="0"/>
-              <a:t>5/25/2019</a:t>
+              <a:t>5/26/2019</a:t>
             </a:fld>
             <a:endParaRPr lang="en-US" dirty="0"/>
           </a:p>
@@ -8949,7 +8949,7 @@
           <a:p>
             <a:fld id="{363EFA5E-FA76-400D-B3DC-F0BA90E6D107}" type="datetimeFigureOut">
               <a:rPr lang="en-US" smtClean="0"/>
-              <a:t>5/25/2019</a:t>
+              <a:t>5/26/2019</a:t>
             </a:fld>
             <a:endParaRPr lang="en-US" dirty="0"/>
           </a:p>
@@ -12026,7 +12026,7 @@
           <a:p>
             <a:fld id="{9D6E9DEC-419B-4CC5-A080-3B06BD5A8291}" type="datetimeFigureOut">
               <a:rPr lang="en-US" smtClean="0"/>
-              <a:t>5/25/2019</a:t>
+              <a:t>5/26/2019</a:t>
             </a:fld>
             <a:endParaRPr lang="en-US" dirty="0"/>
           </a:p>
@@ -15184,19 +15184,19 @@
           <a:p>
             <a:pPr lvl="1"/>
             <a:r>
-              <a:rPr lang="es-ES" sz="1050" dirty="0"/>
+              <a:rPr lang="es-ES" sz="1200" dirty="0"/>
               <a:t>En el área de visualización 3D se puede observar un </a:t>
             </a:r>
             <a:r>
-              <a:rPr lang="es-ES" sz="1050" u="sng" dirty="0"/>
+              <a:rPr lang="es-ES" sz="1200" u="sng" dirty="0"/>
               <a:t>escarabajo</a:t>
             </a:r>
             <a:r>
-              <a:rPr lang="es-ES" sz="1050" dirty="0"/>
+              <a:rPr lang="es-ES" sz="1200" dirty="0"/>
               <a:t> que indica la orientación actual respecto a los 3 ejes (</a:t>
             </a:r>
             <a:r>
-              <a:rPr lang="es-ES" sz="1050" dirty="0">
+              <a:rPr lang="es-ES" sz="1200" dirty="0">
                 <a:solidFill>
                   <a:srgbClr val="C00000"/>
                 </a:solidFill>
@@ -15204,7 +15204,7 @@
               <a:t>X</a:t>
             </a:r>
             <a:r>
-              <a:rPr lang="es-ES" sz="1050" dirty="0">
+              <a:rPr lang="es-ES" sz="1200" dirty="0">
                 <a:solidFill>
                   <a:schemeClr val="bg1">
                     <a:lumMod val="95000"/>
@@ -15215,7 +15215,7 @@
               <a:t>, </a:t>
             </a:r>
             <a:r>
-              <a:rPr lang="es-ES" sz="1050" dirty="0">
+              <a:rPr lang="es-ES" sz="1200" dirty="0">
                 <a:solidFill>
                   <a:srgbClr val="0070C0"/>
                 </a:solidFill>
@@ -15223,7 +15223,7 @@
               <a:t>Z</a:t>
             </a:r>
             <a:r>
-              <a:rPr lang="es-ES" sz="1050" dirty="0">
+              <a:rPr lang="es-ES" sz="1200" dirty="0">
                 <a:solidFill>
                   <a:schemeClr val="bg1">
                     <a:lumMod val="95000"/>
@@ -15234,7 +15234,7 @@
               <a:t>, </a:t>
             </a:r>
             <a:r>
-              <a:rPr lang="es-ES" sz="1050" dirty="0">
+              <a:rPr lang="es-ES" sz="1200" dirty="0">
                 <a:solidFill>
                   <a:srgbClr val="00B050"/>
                 </a:solidFill>
@@ -15242,7 +15242,7 @@
               <a:t>Y</a:t>
             </a:r>
             <a:r>
-              <a:rPr lang="es-ES" sz="1050" dirty="0"/>
+              <a:rPr lang="es-ES" sz="1200" dirty="0"/>
               <a:t>), siendo su cabeza la dirección hacia la que se está “apuntando”.</a:t>
             </a:r>
           </a:p>
@@ -16578,10 +16578,10 @@
       </p:pic>
       <p:pic>
         <p:nvPicPr>
-          <p:cNvPr id="39" name="Picture 38">
+          <p:cNvPr id="5" name="Picture 4">
             <a:extLst>
               <a:ext uri="{FF2B5EF4-FFF2-40B4-BE49-F238E27FC236}">
-                <a16:creationId xmlns:a16="http://schemas.microsoft.com/office/drawing/2014/main" id="{DB3B23C8-7ECF-43CB-AFAE-912571B90D7C}"/>
+                <a16:creationId xmlns:a16="http://schemas.microsoft.com/office/drawing/2014/main" id="{108C8687-A8B7-46FE-9AEF-C6D3C3C13B52}"/>
               </a:ext>
             </a:extLst>
           </p:cNvPr>
@@ -16598,8 +16598,8 @@
         </p:blipFill>
         <p:spPr>
           <a:xfrm>
-            <a:off x="3042705" y="5429328"/>
-            <a:ext cx="1428750" cy="228600"/>
+            <a:off x="3137954" y="5470385"/>
+            <a:ext cx="809625" cy="238125"/>
           </a:xfrm>
           <a:prstGeom prst="rect">
             <a:avLst/>
@@ -17600,7 +17600,7 @@
                                           </p:stCondLst>
                                         </p:cTn>
                                         <p:tgtEl>
-                                          <p:spTgt spid="39"/>
+                                          <p:spTgt spid="5"/>
                                         </p:tgtEl>
                                         <p:attrNameLst>
                                           <p:attrName>style.visibility</p:attrName>
@@ -17614,7 +17614,7 @@
                                       <p:cBhvr>
                                         <p:cTn id="85" dur="500"/>
                                         <p:tgtEl>
-                                          <p:spTgt spid="39"/>
+                                          <p:spTgt spid="5"/>
                                         </p:tgtEl>
                                       </p:cBhvr>
                                     </p:animEffect>
@@ -17699,46 +17699,6 @@
       </p:sp>
       <p:sp>
         <p:nvSpPr>
-          <p:cNvPr id="4" name="Text Placeholder 3">
-            <a:extLst>
-              <a:ext uri="{FF2B5EF4-FFF2-40B4-BE49-F238E27FC236}">
-                <a16:creationId xmlns:a16="http://schemas.microsoft.com/office/drawing/2014/main" id="{7AEE61EB-BF99-4423-AD19-A2408C738732}"/>
-              </a:ext>
-            </a:extLst>
-          </p:cNvPr>
-          <p:cNvSpPr>
-            <a:spLocks noGrp="1"/>
-          </p:cNvSpPr>
-          <p:nvPr>
-            <p:ph type="body" idx="1"/>
-          </p:nvPr>
-        </p:nvSpPr>
-        <p:spPr>
-          <a:xfrm>
-            <a:off x="427568" y="2070721"/>
-            <a:ext cx="6384051" cy="873198"/>
-          </a:xfrm>
-        </p:spPr>
-        <p:txBody>
-          <a:bodyPr>
-            <a:normAutofit lnSpcReduction="10000"/>
-          </a:bodyPr>
-          <a:lstStyle/>
-          <a:p>
-            <a:pPr marL="285750" indent="-285750">
-              <a:buFont typeface="Arial" panose="020B0604020202020204" pitchFamily="34" charset="0"/>
-              <a:buChar char="•"/>
-            </a:pPr>
-            <a:r>
-              <a:rPr lang="es-ES" sz="1600" b="0" dirty="0"/>
-              <a:t>Ahora se explica paso a paso como crear un Sprite que dibuje la figura geométrica correspondiente al número de lados que se indique.</a:t>
-            </a:r>
-            <a:endParaRPr lang="es-ES" dirty="0"/>
-          </a:p>
-        </p:txBody>
-      </p:sp>
-      <p:sp>
-        <p:nvSpPr>
           <p:cNvPr id="6" name="Content Placeholder 5">
             <a:extLst>
               <a:ext uri="{FF2B5EF4-FFF2-40B4-BE49-F238E27FC236}">
@@ -17837,7 +17797,7 @@
             </a:pPr>
             <a:r>
               <a:rPr lang="es-ES" dirty="0"/>
-              <a:t>Lo que se quiere es que completen los grados de un círculo, para así cerrar la figura.</a:t>
+              <a:t>Lo que se quiere es girar los grados de un círculo (360º) , para así cerrar la figura.</a:t>
             </a:r>
           </a:p>
           <a:p>
@@ -17847,7 +17807,15 @@
             </a:pPr>
             <a:r>
               <a:rPr lang="es-ES" dirty="0"/>
-              <a:t>El fundamento por tanto es girar un número de grados múltiplo del número de lados de la figura. </a:t>
+              <a:t>El fundamento por tanto, es girar un número de grados múltiplo del número de lados de la figura (360/</a:t>
+            </a:r>
+            <a:r>
+              <a:rPr lang="es-ES" dirty="0" err="1"/>
+              <a:t>nºlados</a:t>
+            </a:r>
+            <a:r>
+              <a:rPr lang="es-ES" dirty="0"/>
+              <a:t>). </a:t>
             </a:r>
           </a:p>
           <a:p>
@@ -17957,36 +17925,6 @@
       </p:pic>
       <p:pic>
         <p:nvPicPr>
-          <p:cNvPr id="22" name="Picture 21">
-            <a:extLst>
-              <a:ext uri="{FF2B5EF4-FFF2-40B4-BE49-F238E27FC236}">
-                <a16:creationId xmlns:a16="http://schemas.microsoft.com/office/drawing/2014/main" id="{1CCE0754-7E4E-4A42-BC8A-8CA0D7911A34}"/>
-              </a:ext>
-            </a:extLst>
-          </p:cNvPr>
-          <p:cNvPicPr>
-            <a:picLocks noChangeAspect="1"/>
-          </p:cNvPicPr>
-          <p:nvPr/>
-        </p:nvPicPr>
-        <p:blipFill>
-          <a:blip r:embed="rId5"/>
-          <a:stretch>
-            <a:fillRect/>
-          </a:stretch>
-        </p:blipFill>
-        <p:spPr>
-          <a:xfrm>
-            <a:off x="7758642" y="2941657"/>
-            <a:ext cx="1428750" cy="228600"/>
-          </a:xfrm>
-          <a:prstGeom prst="rect">
-            <a:avLst/>
-          </a:prstGeom>
-        </p:spPr>
-      </p:pic>
-      <p:pic>
-        <p:nvPicPr>
           <p:cNvPr id="24" name="Picture 23">
             <a:extLst>
               <a:ext uri="{FF2B5EF4-FFF2-40B4-BE49-F238E27FC236}">
@@ -18000,7 +17938,7 @@
           <p:nvPr/>
         </p:nvPicPr>
         <p:blipFill>
-          <a:blip r:embed="rId6"/>
+          <a:blip r:embed="rId5"/>
           <a:stretch>
             <a:fillRect/>
           </a:stretch>
@@ -18067,6 +18005,75 @@
           </a:p>
         </p:txBody>
       </p:sp>
+      <p:sp>
+        <p:nvSpPr>
+          <p:cNvPr id="17" name="Rectangle 16">
+            <a:extLst>
+              <a:ext uri="{FF2B5EF4-FFF2-40B4-BE49-F238E27FC236}">
+                <a16:creationId xmlns:a16="http://schemas.microsoft.com/office/drawing/2014/main" id="{A535FCC4-3E55-41B5-BA9A-C351E38AB5D4}"/>
+              </a:ext>
+            </a:extLst>
+          </p:cNvPr>
+          <p:cNvSpPr/>
+          <p:nvPr/>
+        </p:nvSpPr>
+        <p:spPr>
+          <a:xfrm>
+            <a:off x="995597" y="1848805"/>
+            <a:ext cx="6510103" cy="923330"/>
+          </a:xfrm>
+          <a:prstGeom prst="rect">
+            <a:avLst/>
+          </a:prstGeom>
+        </p:spPr>
+        <p:txBody>
+          <a:bodyPr wrap="square">
+            <a:spAutoFit/>
+          </a:bodyPr>
+          <a:lstStyle/>
+          <a:p>
+            <a:pPr marL="285750" indent="-285750">
+              <a:buFont typeface="Arial" panose="020B0604020202020204" pitchFamily="34" charset="0"/>
+              <a:buChar char="•"/>
+            </a:pPr>
+            <a:r>
+              <a:rPr lang="es-ES" dirty="0"/>
+              <a:t>En este ejemplo se muestra paso a paso como crear un Sprite que dibuje la figura geométrica correspondiente al número de lados  indicado.</a:t>
+            </a:r>
+            <a:endParaRPr lang="es-ES" sz="2000" dirty="0"/>
+          </a:p>
+        </p:txBody>
+      </p:sp>
+      <p:pic>
+        <p:nvPicPr>
+          <p:cNvPr id="11" name="Picture 10">
+            <a:extLst>
+              <a:ext uri="{FF2B5EF4-FFF2-40B4-BE49-F238E27FC236}">
+                <a16:creationId xmlns:a16="http://schemas.microsoft.com/office/drawing/2014/main" id="{5810F242-B0B5-4661-81A4-79CBEEEC22EE}"/>
+              </a:ext>
+            </a:extLst>
+          </p:cNvPr>
+          <p:cNvPicPr>
+            <a:picLocks noChangeAspect="1"/>
+          </p:cNvPicPr>
+          <p:nvPr/>
+        </p:nvPicPr>
+        <p:blipFill>
+          <a:blip r:embed="rId6"/>
+          <a:stretch>
+            <a:fillRect/>
+          </a:stretch>
+        </p:blipFill>
+        <p:spPr>
+          <a:xfrm>
+            <a:off x="7758642" y="2950915"/>
+            <a:ext cx="809625" cy="238125"/>
+          </a:xfrm>
+          <a:prstGeom prst="rect">
+            <a:avLst/>
+          </a:prstGeom>
+        </p:spPr>
+      </p:pic>
     </p:spTree>
     <p:extLst>
       <p:ext uri="{BB962C8B-B14F-4D97-AF65-F5344CB8AC3E}">
@@ -18111,7 +18118,7 @@
                                           </p:stCondLst>
                                         </p:cTn>
                                         <p:tgtEl>
-                                          <p:spTgt spid="4">
+                                          <p:spTgt spid="17">
                                             <p:txEl>
                                               <p:pRg st="0" end="0"/>
                                             </p:txEl>
@@ -18129,7 +18136,7 @@
                                       <p:cBhvr>
                                         <p:cTn id="7" dur="500"/>
                                         <p:tgtEl>
-                                          <p:spTgt spid="4">
+                                          <p:spTgt spid="17">
                                             <p:txEl>
                                               <p:pRg st="0" end="0"/>
                                             </p:txEl>
@@ -18346,7 +18353,7 @@
                                           </p:stCondLst>
                                         </p:cTn>
                                         <p:tgtEl>
-                                          <p:spTgt spid="22"/>
+                                          <p:spTgt spid="11"/>
                                         </p:tgtEl>
                                         <p:attrNameLst>
                                           <p:attrName>style.visibility</p:attrName>
@@ -18360,7 +18367,7 @@
                                       <p:cBhvr>
                                         <p:cTn id="26" dur="500"/>
                                         <p:tgtEl>
-                                          <p:spTgt spid="22"/>
+                                          <p:spTgt spid="11"/>
                                         </p:tgtEl>
                                       </p:cBhvr>
                                     </p:animEffect>

</xml_diff>